<commit_message>
Added slides on data for galaxy project
</commit_message>
<xml_diff>
--- a/DAY3/02 - CNN/Introduction to CNNs.pptx
+++ b/DAY3/02 - CNN/Introduction to CNNs.pptx
@@ -5,7 +5,7 @@
     <p:sldMasterId id="2147483678" r:id="rId1"/>
   </p:sldMasterIdLst>
   <p:notesMasterIdLst>
-    <p:notesMasterId r:id="rId18"/>
+    <p:notesMasterId r:id="rId17"/>
   </p:notesMasterIdLst>
   <p:sldIdLst>
     <p:sldId id="256" r:id="rId2"/>
@@ -23,31 +23,30 @@
     <p:sldId id="313" r:id="rId14"/>
     <p:sldId id="314" r:id="rId15"/>
     <p:sldId id="315" r:id="rId16"/>
-    <p:sldId id="332" r:id="rId17"/>
   </p:sldIdLst>
   <p:sldSz cx="9144000" cy="5143500" type="screen16x9"/>
   <p:notesSz cx="6858000" cy="9144000"/>
   <p:embeddedFontLst>
     <p:embeddedFont>
       <p:font typeface="Lato" panose="020F0502020204030203" pitchFamily="34" charset="0"/>
-      <p:regular r:id="rId19"/>
-      <p:bold r:id="rId20"/>
-      <p:italic r:id="rId21"/>
-      <p:boldItalic r:id="rId22"/>
+      <p:regular r:id="rId18"/>
+      <p:bold r:id="rId19"/>
+      <p:italic r:id="rId20"/>
+      <p:boldItalic r:id="rId21"/>
     </p:embeddedFont>
     <p:embeddedFont>
       <p:font typeface="Raleway" pitchFamily="2" charset="77"/>
-      <p:regular r:id="rId23"/>
-      <p:bold r:id="rId24"/>
-      <p:italic r:id="rId25"/>
-      <p:boldItalic r:id="rId26"/>
+      <p:regular r:id="rId22"/>
+      <p:bold r:id="rId23"/>
+      <p:italic r:id="rId24"/>
+      <p:boldItalic r:id="rId25"/>
     </p:embeddedFont>
     <p:embeddedFont>
       <p:font typeface="Raleway Light" pitchFamily="2" charset="77"/>
-      <p:regular r:id="rId27"/>
-      <p:bold r:id="rId28"/>
-      <p:italic r:id="rId29"/>
-      <p:boldItalic r:id="rId30"/>
+      <p:regular r:id="rId26"/>
+      <p:bold r:id="rId27"/>
+      <p:italic r:id="rId28"/>
+      <p:boldItalic r:id="rId29"/>
     </p:embeddedFont>
   </p:embeddedFontLst>
   <p:defaultTextStyle>
@@ -1467,110 +1466,6 @@
 </p:notes>
 </file>
 
-<file path=ppt/notesSlides/notesSlide16.xml><?xml version="1.0" encoding="utf-8"?>
-<p:notes xmlns:a="http://schemas.openxmlformats.org/drawingml/2006/main" xmlns:r="http://schemas.openxmlformats.org/officeDocument/2006/relationships" xmlns:p="http://schemas.openxmlformats.org/presentationml/2006/main" showMasterSp="0" showMasterPhAnim="0">
-  <p:cSld>
-    <p:spTree>
-      <p:nvGrpSpPr>
-        <p:cNvPr id="1" name="Shape 780"/>
-        <p:cNvGrpSpPr/>
-        <p:nvPr/>
-      </p:nvGrpSpPr>
-      <p:grpSpPr>
-        <a:xfrm>
-          <a:off x="0" y="0"/>
-          <a:ext cx="0" cy="0"/>
-          <a:chOff x="0" y="0"/>
-          <a:chExt cx="0" cy="0"/>
-        </a:xfrm>
-      </p:grpSpPr>
-      <p:sp>
-        <p:nvSpPr>
-          <p:cNvPr id="781" name="Google Shape;781;g62255e7d9e_1_203:notes"/>
-          <p:cNvSpPr>
-            <a:spLocks noGrp="1" noRot="1" noChangeAspect="1"/>
-          </p:cNvSpPr>
-          <p:nvPr>
-            <p:ph type="sldImg" idx="2"/>
-          </p:nvPr>
-        </p:nvSpPr>
-        <p:spPr>
-          <a:xfrm>
-            <a:off x="381000" y="685800"/>
-            <a:ext cx="6096000" cy="3429000"/>
-          </a:xfrm>
-          <a:custGeom>
-            <a:avLst/>
-            <a:gdLst/>
-            <a:ahLst/>
-            <a:cxnLst/>
-            <a:rect l="l" t="t" r="r" b="b"/>
-            <a:pathLst>
-              <a:path w="120000" h="120000" extrusionOk="0">
-                <a:moveTo>
-                  <a:pt x="0" y="0"/>
-                </a:moveTo>
-                <a:lnTo>
-                  <a:pt x="120000" y="0"/>
-                </a:lnTo>
-                <a:lnTo>
-                  <a:pt x="120000" y="120000"/>
-                </a:lnTo>
-                <a:lnTo>
-                  <a:pt x="0" y="120000"/>
-                </a:lnTo>
-                <a:close/>
-              </a:path>
-            </a:pathLst>
-          </a:custGeom>
-        </p:spPr>
-      </p:sp>
-      <p:sp>
-        <p:nvSpPr>
-          <p:cNvPr id="782" name="Google Shape;782;g62255e7d9e_1_203:notes"/>
-          <p:cNvSpPr txBox="1">
-            <a:spLocks noGrp="1"/>
-          </p:cNvSpPr>
-          <p:nvPr>
-            <p:ph type="body" idx="1"/>
-          </p:nvPr>
-        </p:nvSpPr>
-        <p:spPr>
-          <a:xfrm>
-            <a:off x="685800" y="4343400"/>
-            <a:ext cx="5486400" cy="4114800"/>
-          </a:xfrm>
-          <a:prstGeom prst="rect">
-            <a:avLst/>
-          </a:prstGeom>
-        </p:spPr>
-        <p:txBody>
-          <a:bodyPr spcFirstLastPara="1" wrap="square" lIns="91425" tIns="91425" rIns="91425" bIns="91425" anchor="t" anchorCtr="0">
-            <a:noAutofit/>
-          </a:bodyPr>
-          <a:lstStyle/>
-          <a:p>
-            <a:pPr marL="0" lvl="0" indent="0" algn="l" rtl="0">
-              <a:spcBef>
-                <a:spcPts val="0"/>
-              </a:spcBef>
-              <a:spcAft>
-                <a:spcPts val="0"/>
-              </a:spcAft>
-              <a:buNone/>
-            </a:pPr>
-            <a:endParaRPr/>
-          </a:p>
-        </p:txBody>
-      </p:sp>
-    </p:spTree>
-  </p:cSld>
-  <p:clrMapOvr>
-    <a:masterClrMapping/>
-  </p:clrMapOvr>
-</p:notes>
-</file>
-
 <file path=ppt/notesSlides/notesSlide2.xml><?xml version="1.0" encoding="utf-8"?>
 <p:notes xmlns:a="http://schemas.openxmlformats.org/drawingml/2006/main" xmlns:r="http://schemas.openxmlformats.org/officeDocument/2006/relationships" xmlns:p="http://schemas.openxmlformats.org/presentationml/2006/main" showMasterSp="0" showMasterPhAnim="0">
   <p:cSld>
@@ -4988,530 +4883,6 @@
       <p:sp>
         <p:nvSpPr>
           <p:cNvPr id="54" name="Google Shape;54;p10"/>
-          <p:cNvSpPr txBox="1">
-            <a:spLocks noGrp="1"/>
-          </p:cNvSpPr>
-          <p:nvPr>
-            <p:ph type="sldNum" idx="12"/>
-          </p:nvPr>
-        </p:nvSpPr>
-        <p:spPr>
-          <a:xfrm>
-            <a:off x="8497999" y="4688759"/>
-            <a:ext cx="548700" cy="393600"/>
-          </a:xfrm>
-          <a:prstGeom prst="rect">
-            <a:avLst/>
-          </a:prstGeom>
-        </p:spPr>
-        <p:txBody>
-          <a:bodyPr spcFirstLastPara="1" wrap="square" lIns="91425" tIns="91425" rIns="91425" bIns="91425" anchor="ctr" anchorCtr="0">
-            <a:noAutofit/>
-          </a:bodyPr>
-          <a:lstStyle>
-            <a:lvl1pPr lvl="0" rtl="0">
-              <a:buNone/>
-              <a:defRPr/>
-            </a:lvl1pPr>
-            <a:lvl2pPr lvl="1" rtl="0">
-              <a:buNone/>
-              <a:defRPr/>
-            </a:lvl2pPr>
-            <a:lvl3pPr lvl="2" rtl="0">
-              <a:buNone/>
-              <a:defRPr/>
-            </a:lvl3pPr>
-            <a:lvl4pPr lvl="3" rtl="0">
-              <a:buNone/>
-              <a:defRPr/>
-            </a:lvl4pPr>
-            <a:lvl5pPr lvl="4" rtl="0">
-              <a:buNone/>
-              <a:defRPr/>
-            </a:lvl5pPr>
-            <a:lvl6pPr lvl="5" rtl="0">
-              <a:buNone/>
-              <a:defRPr/>
-            </a:lvl6pPr>
-            <a:lvl7pPr lvl="6" rtl="0">
-              <a:buNone/>
-              <a:defRPr/>
-            </a:lvl7pPr>
-            <a:lvl8pPr lvl="7" rtl="0">
-              <a:buNone/>
-              <a:defRPr/>
-            </a:lvl8pPr>
-            <a:lvl9pPr lvl="8" rtl="0">
-              <a:buNone/>
-              <a:defRPr/>
-            </a:lvl9pPr>
-          </a:lstStyle>
-          <a:p>
-            <a:pPr marL="0" lvl="0" indent="0" algn="r" rtl="0">
-              <a:spcBef>
-                <a:spcPts val="0"/>
-              </a:spcBef>
-              <a:spcAft>
-                <a:spcPts val="0"/>
-              </a:spcAft>
-              <a:buNone/>
-            </a:pPr>
-            <a:fld id="{00000000-1234-1234-1234-123412341234}" type="slidenum">
-              <a:rPr lang="en"/>
-              <a:t>‹#›</a:t>
-            </a:fld>
-            <a:endParaRPr/>
-          </a:p>
-        </p:txBody>
-      </p:sp>
-    </p:spTree>
-  </p:cSld>
-  <p:clrMapOvr>
-    <a:masterClrMapping/>
-  </p:clrMapOvr>
-</p:sldLayout>
-</file>
-
-<file path=ppt/slideLayouts/slideLayout7.xml><?xml version="1.0" encoding="utf-8"?>
-<p:sldLayout xmlns:a="http://schemas.openxmlformats.org/drawingml/2006/main" xmlns:r="http://schemas.openxmlformats.org/officeDocument/2006/relationships" xmlns:p="http://schemas.openxmlformats.org/presentationml/2006/main" matchingName="Big number">
-  <p:cSld name="BIG_NUMBER">
-    <p:spTree>
-      <p:nvGrpSpPr>
-        <p:cNvPr id="1" name="Shape 55"/>
-        <p:cNvGrpSpPr/>
-        <p:nvPr/>
-      </p:nvGrpSpPr>
-      <p:grpSpPr>
-        <a:xfrm>
-          <a:off x="0" y="0"/>
-          <a:ext cx="0" cy="0"/>
-          <a:chOff x="0" y="0"/>
-          <a:chExt cx="0" cy="0"/>
-        </a:xfrm>
-      </p:grpSpPr>
-      <p:cxnSp>
-        <p:nvCxnSpPr>
-          <p:cNvPr id="56" name="Google Shape;56;p11"/>
-          <p:cNvCxnSpPr/>
-          <p:nvPr/>
-        </p:nvCxnSpPr>
-        <p:spPr>
-          <a:xfrm>
-            <a:off x="425200" y="4740000"/>
-            <a:ext cx="8296800" cy="0"/>
-          </a:xfrm>
-          <a:prstGeom prst="straightConnector1">
-            <a:avLst/>
-          </a:prstGeom>
-          <a:noFill/>
-          <a:ln w="19050" cap="flat" cmpd="sng">
-            <a:solidFill>
-              <a:schemeClr val="dk2"/>
-            </a:solidFill>
-            <a:prstDash val="solid"/>
-            <a:round/>
-            <a:headEnd type="none" w="sm" len="sm"/>
-            <a:tailEnd type="none" w="sm" len="sm"/>
-          </a:ln>
-        </p:spPr>
-      </p:cxnSp>
-      <p:cxnSp>
-        <p:nvCxnSpPr>
-          <p:cNvPr id="57" name="Google Shape;57;p11"/>
-          <p:cNvCxnSpPr/>
-          <p:nvPr/>
-        </p:nvCxnSpPr>
-        <p:spPr>
-          <a:xfrm>
-            <a:off x="425200" y="415650"/>
-            <a:ext cx="8296800" cy="0"/>
-          </a:xfrm>
-          <a:prstGeom prst="straightConnector1">
-            <a:avLst/>
-          </a:prstGeom>
-          <a:noFill/>
-          <a:ln w="38100" cap="flat" cmpd="sng">
-            <a:solidFill>
-              <a:schemeClr val="dk2"/>
-            </a:solidFill>
-            <a:prstDash val="solid"/>
-            <a:round/>
-            <a:headEnd type="none" w="sm" len="sm"/>
-            <a:tailEnd type="none" w="sm" len="sm"/>
-          </a:ln>
-        </p:spPr>
-      </p:cxnSp>
-      <p:sp>
-        <p:nvSpPr>
-          <p:cNvPr id="58" name="Google Shape;58;p11"/>
-          <p:cNvSpPr txBox="1">
-            <a:spLocks noGrp="1"/>
-          </p:cNvSpPr>
-          <p:nvPr>
-            <p:ph type="title" hasCustomPrompt="1"/>
-          </p:nvPr>
-        </p:nvSpPr>
-        <p:spPr>
-          <a:xfrm>
-            <a:off x="853950" y="1304850"/>
-            <a:ext cx="7436100" cy="1538400"/>
-          </a:xfrm>
-          <a:prstGeom prst="rect">
-            <a:avLst/>
-          </a:prstGeom>
-        </p:spPr>
-        <p:txBody>
-          <a:bodyPr spcFirstLastPara="1" wrap="square" lIns="91425" tIns="91425" rIns="91425" bIns="91425" anchor="ctr" anchorCtr="0">
-            <a:noAutofit/>
-          </a:bodyPr>
-          <a:lstStyle>
-            <a:lvl1pPr lvl="0" algn="ctr" rtl="0">
-              <a:spcBef>
-                <a:spcPts val="0"/>
-              </a:spcBef>
-              <a:spcAft>
-                <a:spcPts val="0"/>
-              </a:spcAft>
-              <a:buClr>
-                <a:schemeClr val="dk1"/>
-              </a:buClr>
-              <a:buSzPts val="9600"/>
-              <a:buFont typeface="Lato"/>
-              <a:buNone/>
-              <a:defRPr sz="9600">
-                <a:solidFill>
-                  <a:schemeClr val="dk1"/>
-                </a:solidFill>
-                <a:latin typeface="Lato"/>
-                <a:ea typeface="Lato"/>
-                <a:cs typeface="Lato"/>
-                <a:sym typeface="Lato"/>
-              </a:defRPr>
-            </a:lvl1pPr>
-            <a:lvl2pPr lvl="1" algn="ctr" rtl="0">
-              <a:spcBef>
-                <a:spcPts val="0"/>
-              </a:spcBef>
-              <a:spcAft>
-                <a:spcPts val="0"/>
-              </a:spcAft>
-              <a:buClr>
-                <a:schemeClr val="dk1"/>
-              </a:buClr>
-              <a:buSzPts val="9600"/>
-              <a:buFont typeface="Lato"/>
-              <a:buNone/>
-              <a:defRPr sz="9600">
-                <a:solidFill>
-                  <a:schemeClr val="dk1"/>
-                </a:solidFill>
-                <a:latin typeface="Lato"/>
-                <a:ea typeface="Lato"/>
-                <a:cs typeface="Lato"/>
-                <a:sym typeface="Lato"/>
-              </a:defRPr>
-            </a:lvl2pPr>
-            <a:lvl3pPr lvl="2" algn="ctr" rtl="0">
-              <a:spcBef>
-                <a:spcPts val="0"/>
-              </a:spcBef>
-              <a:spcAft>
-                <a:spcPts val="0"/>
-              </a:spcAft>
-              <a:buClr>
-                <a:schemeClr val="dk1"/>
-              </a:buClr>
-              <a:buSzPts val="9600"/>
-              <a:buFont typeface="Lato"/>
-              <a:buNone/>
-              <a:defRPr sz="9600">
-                <a:solidFill>
-                  <a:schemeClr val="dk1"/>
-                </a:solidFill>
-                <a:latin typeface="Lato"/>
-                <a:ea typeface="Lato"/>
-                <a:cs typeface="Lato"/>
-                <a:sym typeface="Lato"/>
-              </a:defRPr>
-            </a:lvl3pPr>
-            <a:lvl4pPr lvl="3" algn="ctr" rtl="0">
-              <a:spcBef>
-                <a:spcPts val="0"/>
-              </a:spcBef>
-              <a:spcAft>
-                <a:spcPts val="0"/>
-              </a:spcAft>
-              <a:buClr>
-                <a:schemeClr val="dk1"/>
-              </a:buClr>
-              <a:buSzPts val="9600"/>
-              <a:buFont typeface="Lato"/>
-              <a:buNone/>
-              <a:defRPr sz="9600">
-                <a:solidFill>
-                  <a:schemeClr val="dk1"/>
-                </a:solidFill>
-                <a:latin typeface="Lato"/>
-                <a:ea typeface="Lato"/>
-                <a:cs typeface="Lato"/>
-                <a:sym typeface="Lato"/>
-              </a:defRPr>
-            </a:lvl4pPr>
-            <a:lvl5pPr lvl="4" algn="ctr" rtl="0">
-              <a:spcBef>
-                <a:spcPts val="0"/>
-              </a:spcBef>
-              <a:spcAft>
-                <a:spcPts val="0"/>
-              </a:spcAft>
-              <a:buClr>
-                <a:schemeClr val="dk1"/>
-              </a:buClr>
-              <a:buSzPts val="9600"/>
-              <a:buFont typeface="Lato"/>
-              <a:buNone/>
-              <a:defRPr sz="9600">
-                <a:solidFill>
-                  <a:schemeClr val="dk1"/>
-                </a:solidFill>
-                <a:latin typeface="Lato"/>
-                <a:ea typeface="Lato"/>
-                <a:cs typeface="Lato"/>
-                <a:sym typeface="Lato"/>
-              </a:defRPr>
-            </a:lvl5pPr>
-            <a:lvl6pPr lvl="5" algn="ctr" rtl="0">
-              <a:spcBef>
-                <a:spcPts val="0"/>
-              </a:spcBef>
-              <a:spcAft>
-                <a:spcPts val="0"/>
-              </a:spcAft>
-              <a:buClr>
-                <a:schemeClr val="dk1"/>
-              </a:buClr>
-              <a:buSzPts val="9600"/>
-              <a:buFont typeface="Lato"/>
-              <a:buNone/>
-              <a:defRPr sz="9600">
-                <a:solidFill>
-                  <a:schemeClr val="dk1"/>
-                </a:solidFill>
-                <a:latin typeface="Lato"/>
-                <a:ea typeface="Lato"/>
-                <a:cs typeface="Lato"/>
-                <a:sym typeface="Lato"/>
-              </a:defRPr>
-            </a:lvl6pPr>
-            <a:lvl7pPr lvl="6" algn="ctr" rtl="0">
-              <a:spcBef>
-                <a:spcPts val="0"/>
-              </a:spcBef>
-              <a:spcAft>
-                <a:spcPts val="0"/>
-              </a:spcAft>
-              <a:buClr>
-                <a:schemeClr val="dk1"/>
-              </a:buClr>
-              <a:buSzPts val="9600"/>
-              <a:buFont typeface="Lato"/>
-              <a:buNone/>
-              <a:defRPr sz="9600">
-                <a:solidFill>
-                  <a:schemeClr val="dk1"/>
-                </a:solidFill>
-                <a:latin typeface="Lato"/>
-                <a:ea typeface="Lato"/>
-                <a:cs typeface="Lato"/>
-                <a:sym typeface="Lato"/>
-              </a:defRPr>
-            </a:lvl7pPr>
-            <a:lvl8pPr lvl="7" algn="ctr" rtl="0">
-              <a:spcBef>
-                <a:spcPts val="0"/>
-              </a:spcBef>
-              <a:spcAft>
-                <a:spcPts val="0"/>
-              </a:spcAft>
-              <a:buClr>
-                <a:schemeClr val="dk1"/>
-              </a:buClr>
-              <a:buSzPts val="9600"/>
-              <a:buFont typeface="Lato"/>
-              <a:buNone/>
-              <a:defRPr sz="9600">
-                <a:solidFill>
-                  <a:schemeClr val="dk1"/>
-                </a:solidFill>
-                <a:latin typeface="Lato"/>
-                <a:ea typeface="Lato"/>
-                <a:cs typeface="Lato"/>
-                <a:sym typeface="Lato"/>
-              </a:defRPr>
-            </a:lvl8pPr>
-            <a:lvl9pPr lvl="8" algn="ctr" rtl="0">
-              <a:spcBef>
-                <a:spcPts val="0"/>
-              </a:spcBef>
-              <a:spcAft>
-                <a:spcPts val="0"/>
-              </a:spcAft>
-              <a:buClr>
-                <a:schemeClr val="dk1"/>
-              </a:buClr>
-              <a:buSzPts val="9600"/>
-              <a:buFont typeface="Lato"/>
-              <a:buNone/>
-              <a:defRPr sz="9600">
-                <a:solidFill>
-                  <a:schemeClr val="dk1"/>
-                </a:solidFill>
-                <a:latin typeface="Lato"/>
-                <a:ea typeface="Lato"/>
-                <a:cs typeface="Lato"/>
-                <a:sym typeface="Lato"/>
-              </a:defRPr>
-            </a:lvl9pPr>
-          </a:lstStyle>
-          <a:p>
-            <a:r>
-              <a:t>xx%</a:t>
-            </a:r>
-          </a:p>
-        </p:txBody>
-      </p:sp>
-      <p:sp>
-        <p:nvSpPr>
-          <p:cNvPr id="59" name="Google Shape;59;p11"/>
-          <p:cNvSpPr txBox="1">
-            <a:spLocks noGrp="1"/>
-          </p:cNvSpPr>
-          <p:nvPr>
-            <p:ph type="body" idx="1"/>
-          </p:nvPr>
-        </p:nvSpPr>
-        <p:spPr>
-          <a:xfrm>
-            <a:off x="853950" y="2919450"/>
-            <a:ext cx="7436100" cy="1071600"/>
-          </a:xfrm>
-          <a:prstGeom prst="rect">
-            <a:avLst/>
-          </a:prstGeom>
-        </p:spPr>
-        <p:txBody>
-          <a:bodyPr spcFirstLastPara="1" wrap="square" lIns="91425" tIns="91425" rIns="91425" bIns="91425" anchor="t" anchorCtr="0">
-            <a:noAutofit/>
-          </a:bodyPr>
-          <a:lstStyle>
-            <a:lvl1pPr marL="457200" lvl="0" indent="-342900" algn="ctr" rtl="0">
-              <a:spcBef>
-                <a:spcPts val="0"/>
-              </a:spcBef>
-              <a:spcAft>
-                <a:spcPts val="0"/>
-              </a:spcAft>
-              <a:buSzPts val="1800"/>
-              <a:buChar char="●"/>
-              <a:defRPr/>
-            </a:lvl1pPr>
-            <a:lvl2pPr marL="914400" lvl="1" indent="-317500" algn="ctr" rtl="0">
-              <a:spcBef>
-                <a:spcPts val="1600"/>
-              </a:spcBef>
-              <a:spcAft>
-                <a:spcPts val="0"/>
-              </a:spcAft>
-              <a:buSzPts val="1400"/>
-              <a:buChar char="○"/>
-              <a:defRPr/>
-            </a:lvl2pPr>
-            <a:lvl3pPr marL="1371600" lvl="2" indent="-317500" algn="ctr" rtl="0">
-              <a:spcBef>
-                <a:spcPts val="1600"/>
-              </a:spcBef>
-              <a:spcAft>
-                <a:spcPts val="0"/>
-              </a:spcAft>
-              <a:buSzPts val="1400"/>
-              <a:buChar char="■"/>
-              <a:defRPr/>
-            </a:lvl3pPr>
-            <a:lvl4pPr marL="1828800" lvl="3" indent="-317500" algn="ctr" rtl="0">
-              <a:spcBef>
-                <a:spcPts val="1600"/>
-              </a:spcBef>
-              <a:spcAft>
-                <a:spcPts val="0"/>
-              </a:spcAft>
-              <a:buSzPts val="1400"/>
-              <a:buChar char="●"/>
-              <a:defRPr/>
-            </a:lvl4pPr>
-            <a:lvl5pPr marL="2286000" lvl="4" indent="-317500" algn="ctr" rtl="0">
-              <a:spcBef>
-                <a:spcPts val="1600"/>
-              </a:spcBef>
-              <a:spcAft>
-                <a:spcPts val="0"/>
-              </a:spcAft>
-              <a:buSzPts val="1400"/>
-              <a:buChar char="○"/>
-              <a:defRPr/>
-            </a:lvl5pPr>
-            <a:lvl6pPr marL="2743200" lvl="5" indent="-317500" algn="ctr" rtl="0">
-              <a:spcBef>
-                <a:spcPts val="1600"/>
-              </a:spcBef>
-              <a:spcAft>
-                <a:spcPts val="0"/>
-              </a:spcAft>
-              <a:buSzPts val="1400"/>
-              <a:buChar char="■"/>
-              <a:defRPr/>
-            </a:lvl6pPr>
-            <a:lvl7pPr marL="3200400" lvl="6" indent="-317500" algn="ctr" rtl="0">
-              <a:spcBef>
-                <a:spcPts val="1600"/>
-              </a:spcBef>
-              <a:spcAft>
-                <a:spcPts val="0"/>
-              </a:spcAft>
-              <a:buSzPts val="1400"/>
-              <a:buChar char="●"/>
-              <a:defRPr/>
-            </a:lvl7pPr>
-            <a:lvl8pPr marL="3657600" lvl="7" indent="-317500" algn="ctr" rtl="0">
-              <a:spcBef>
-                <a:spcPts val="1600"/>
-              </a:spcBef>
-              <a:spcAft>
-                <a:spcPts val="0"/>
-              </a:spcAft>
-              <a:buSzPts val="1400"/>
-              <a:buChar char="○"/>
-              <a:defRPr/>
-            </a:lvl8pPr>
-            <a:lvl9pPr marL="4114800" lvl="8" indent="-317500" algn="ctr" rtl="0">
-              <a:spcBef>
-                <a:spcPts val="1600"/>
-              </a:spcBef>
-              <a:spcAft>
-                <a:spcPts val="1600"/>
-              </a:spcAft>
-              <a:buSzPts val="1400"/>
-              <a:buChar char="■"/>
-              <a:defRPr/>
-            </a:lvl9pPr>
-          </a:lstStyle>
-          <a:p>
-            <a:endParaRPr/>
-          </a:p>
-        </p:txBody>
-      </p:sp>
-      <p:sp>
-        <p:nvSpPr>
-          <p:cNvPr id="60" name="Google Shape;60;p11"/>
           <p:cNvSpPr txBox="1">
             <a:spLocks noGrp="1"/>
           </p:cNvSpPr>
@@ -6295,7 +5666,6 @@
     <p:sldLayoutId id="2147483653" r:id="rId4"/>
     <p:sldLayoutId id="2147483655" r:id="rId5"/>
     <p:sldLayoutId id="2147483656" r:id="rId6"/>
-    <p:sldLayoutId id="2147483657" r:id="rId7"/>
   </p:sldLayoutIdLst>
   <p:transition spd="med">
     <p:fade/>
@@ -8284,171 +7654,6 @@
 </p:sld>
 </file>
 
-<file path=ppt/slides/slide16.xml><?xml version="1.0" encoding="utf-8"?>
-<p:sld xmlns:a="http://schemas.openxmlformats.org/drawingml/2006/main" xmlns:r="http://schemas.openxmlformats.org/officeDocument/2006/relationships" xmlns:p="http://schemas.openxmlformats.org/presentationml/2006/main">
-  <p:cSld>
-    <p:spTree>
-      <p:nvGrpSpPr>
-        <p:cNvPr id="1" name="Shape 783"/>
-        <p:cNvGrpSpPr/>
-        <p:nvPr/>
-      </p:nvGrpSpPr>
-      <p:grpSpPr>
-        <a:xfrm>
-          <a:off x="0" y="0"/>
-          <a:ext cx="0" cy="0"/>
-          <a:chOff x="0" y="0"/>
-          <a:chExt cx="0" cy="0"/>
-        </a:xfrm>
-      </p:grpSpPr>
-      <p:sp>
-        <p:nvSpPr>
-          <p:cNvPr id="784" name="Google Shape;784;p110"/>
-          <p:cNvSpPr txBox="1">
-            <a:spLocks noGrp="1"/>
-          </p:cNvSpPr>
-          <p:nvPr>
-            <p:ph type="title"/>
-          </p:nvPr>
-        </p:nvSpPr>
-        <p:spPr>
-          <a:xfrm>
-            <a:off x="853950" y="619050"/>
-            <a:ext cx="7436100" cy="2553600"/>
-          </a:xfrm>
-          <a:prstGeom prst="rect">
-            <a:avLst/>
-          </a:prstGeom>
-        </p:spPr>
-        <p:txBody>
-          <a:bodyPr spcFirstLastPara="1" wrap="square" lIns="91425" tIns="91425" rIns="91425" bIns="91425" anchor="ctr" anchorCtr="0">
-            <a:noAutofit/>
-          </a:bodyPr>
-          <a:lstStyle/>
-          <a:p>
-            <a:pPr marL="0" lvl="0" indent="0" algn="ctr" rtl="0">
-              <a:spcBef>
-                <a:spcPts val="0"/>
-              </a:spcBef>
-              <a:spcAft>
-                <a:spcPts val="0"/>
-              </a:spcAft>
-              <a:buNone/>
-            </a:pPr>
-            <a:r>
-              <a:rPr lang="en" sz="7200"/>
-              <a:t>Hands-on</a:t>
-            </a:r>
-            <a:endParaRPr sz="7200"/>
-          </a:p>
-          <a:p>
-            <a:pPr marL="0" lvl="0" indent="0" algn="ctr" rtl="0">
-              <a:spcBef>
-                <a:spcPts val="0"/>
-              </a:spcBef>
-              <a:spcAft>
-                <a:spcPts val="0"/>
-              </a:spcAft>
-              <a:buNone/>
-            </a:pPr>
-            <a:r>
-              <a:rPr lang="en" sz="7200"/>
-              <a:t>Session (CNN)</a:t>
-            </a:r>
-            <a:endParaRPr sz="7200"/>
-          </a:p>
-        </p:txBody>
-      </p:sp>
-      <p:sp>
-        <p:nvSpPr>
-          <p:cNvPr id="785" name="Google Shape;785;p110"/>
-          <p:cNvSpPr txBox="1"/>
-          <p:nvPr/>
-        </p:nvSpPr>
-        <p:spPr>
-          <a:xfrm>
-            <a:off x="380550" y="3216575"/>
-            <a:ext cx="8382900" cy="1350300"/>
-          </a:xfrm>
-          <a:prstGeom prst="rect">
-            <a:avLst/>
-          </a:prstGeom>
-          <a:noFill/>
-          <a:ln>
-            <a:noFill/>
-          </a:ln>
-        </p:spPr>
-        <p:txBody>
-          <a:bodyPr spcFirstLastPara="1" wrap="square" lIns="91425" tIns="91425" rIns="91425" bIns="91425" anchor="t" anchorCtr="0">
-            <a:noAutofit/>
-          </a:bodyPr>
-          <a:lstStyle/>
-          <a:p>
-            <a:pPr marL="457200" lvl="0" indent="-317500" algn="l" rtl="0">
-              <a:spcBef>
-                <a:spcPts val="0"/>
-              </a:spcBef>
-              <a:spcAft>
-                <a:spcPts val="0"/>
-              </a:spcAft>
-              <a:buSzPts val="1400"/>
-              <a:buAutoNum type="arabicParenR"/>
-            </a:pPr>
-            <a:r>
-              <a:rPr lang="en" u="sng">
-                <a:solidFill>
-                  <a:schemeClr val="hlink"/>
-                </a:solidFill>
-                <a:hlinkClick r:id="rId3"/>
-              </a:rPr>
-              <a:t>https://github.com/michelucci/oreilly-london-ai/blob/master/day1/Beginner%20friendly%20networks/First_example_of_a_CNN_with_the_MNIST_dataset.ipynb</a:t>
-            </a:r>
-            <a:endParaRPr/>
-          </a:p>
-          <a:p>
-            <a:pPr marL="0" lvl="0" indent="0" algn="l" rtl="0">
-              <a:spcBef>
-                <a:spcPts val="0"/>
-              </a:spcBef>
-              <a:spcAft>
-                <a:spcPts val="0"/>
-              </a:spcAft>
-              <a:buNone/>
-            </a:pPr>
-            <a:endParaRPr/>
-          </a:p>
-          <a:p>
-            <a:pPr marL="457200" lvl="0" indent="-317500" algn="l" rtl="0">
-              <a:spcBef>
-                <a:spcPts val="0"/>
-              </a:spcBef>
-              <a:spcAft>
-                <a:spcPts val="0"/>
-              </a:spcAft>
-              <a:buSzPts val="1400"/>
-              <a:buAutoNum type="arabicParenR"/>
-            </a:pPr>
-            <a:r>
-              <a:rPr lang="en" u="sng">
-                <a:solidFill>
-                  <a:schemeClr val="hlink"/>
-                </a:solidFill>
-                <a:hlinkClick r:id="rId4"/>
-              </a:rPr>
-              <a:t>https://github.com/michelucci/oreilly-london-ai/blob/master/day1/Beginner%20friendly%20networks/First_Example_of_a_CNN_(CIFAR10).ipynb</a:t>
-            </a:r>
-            <a:endParaRPr/>
-          </a:p>
-        </p:txBody>
-      </p:sp>
-    </p:spTree>
-  </p:cSld>
-  <p:clrMapOvr>
-    <a:masterClrMapping/>
-  </p:clrMapOvr>
-</p:sld>
-</file>
-
 <file path=ppt/slides/slide2.xml><?xml version="1.0" encoding="utf-8"?>
 <p:sld xmlns:a="http://schemas.openxmlformats.org/drawingml/2006/main" xmlns:r="http://schemas.openxmlformats.org/officeDocument/2006/relationships" xmlns:p="http://schemas.openxmlformats.org/presentationml/2006/main">
   <p:cSld>

</xml_diff>